<commit_message>
chore: power point presentation and docker file fix
</commit_message>
<xml_diff>
--- a/Transaction Labelling Strategy Architecture.pptx
+++ b/Transaction Labelling Strategy Architecture.pptx
@@ -11,6 +11,11 @@
     <p:sldId id="259" r:id="rId5"/>
     <p:sldId id="260" r:id="rId6"/>
     <p:sldId id="261" r:id="rId7"/>
+    <p:sldId id="262" r:id="rId8"/>
+    <p:sldId id="263" r:id="rId9"/>
+    <p:sldId id="264" r:id="rId10"/>
+    <p:sldId id="266" r:id="rId11"/>
+    <p:sldId id="265" r:id="rId12"/>
   </p:sldIdLst>
   <p:sldSz cx="12192000" cy="6858000"/>
   <p:notesSz cx="6858000" cy="9144000"/>
@@ -5905,6 +5910,719 @@
 </p:sld>
 </file>
 
+<file path=ppt/slides/slide10.xml><?xml version="1.0" encoding="utf-8"?>
+<p:sld xmlns:a="http://schemas.openxmlformats.org/drawingml/2006/main" xmlns:r="http://schemas.openxmlformats.org/officeDocument/2006/relationships" xmlns:p="http://schemas.openxmlformats.org/presentationml/2006/main">
+  <p:cSld>
+    <p:spTree>
+      <p:nvGrpSpPr>
+        <p:cNvPr id="1" name=""/>
+        <p:cNvGrpSpPr/>
+        <p:nvPr/>
+      </p:nvGrpSpPr>
+      <p:grpSpPr>
+        <a:xfrm>
+          <a:off x="0" y="0"/>
+          <a:ext cx="0" cy="0"/>
+          <a:chOff x="0" y="0"/>
+          <a:chExt cx="0" cy="0"/>
+        </a:xfrm>
+      </p:grpSpPr>
+      <p:sp>
+        <p:nvSpPr>
+          <p:cNvPr id="4" name="TextBox 3">
+            <a:extLst>
+              <a:ext uri="{FF2B5EF4-FFF2-40B4-BE49-F238E27FC236}">
+                <a16:creationId xmlns:a16="http://schemas.microsoft.com/office/drawing/2014/main" id="{F92EF9EB-12F0-D0F0-6B35-506E0AAFE841}"/>
+              </a:ext>
+            </a:extLst>
+          </p:cNvPr>
+          <p:cNvSpPr txBox="1"/>
+          <p:nvPr/>
+        </p:nvSpPr>
+        <p:spPr>
+          <a:xfrm>
+            <a:off x="512596" y="189291"/>
+            <a:ext cx="11679403" cy="1323439"/>
+          </a:xfrm>
+          <a:prstGeom prst="rect">
+            <a:avLst/>
+          </a:prstGeom>
+          <a:noFill/>
+        </p:spPr>
+        <p:txBody>
+          <a:bodyPr wrap="square" rtlCol="0">
+            <a:spAutoFit/>
+          </a:bodyPr>
+          <a:lstStyle/>
+          <a:p>
+            <a:r>
+              <a:rPr lang="en-US" sz="4000" dirty="0"/>
+              <a:t>Implementation Consideration for Optimal Performance – </a:t>
+            </a:r>
+            <a:r>
+              <a:rPr lang="en-US" sz="3000" dirty="0">
+                <a:solidFill>
+                  <a:schemeClr val="accent1"/>
+                </a:solidFill>
+              </a:rPr>
+              <a:t>Scalability and Performance Optimization</a:t>
+            </a:r>
+          </a:p>
+        </p:txBody>
+      </p:sp>
+      <p:sp>
+        <p:nvSpPr>
+          <p:cNvPr id="8" name="TextBox 7">
+            <a:extLst>
+              <a:ext uri="{FF2B5EF4-FFF2-40B4-BE49-F238E27FC236}">
+                <a16:creationId xmlns:a16="http://schemas.microsoft.com/office/drawing/2014/main" id="{ED376AD0-796C-AD83-5F7D-4B8802D7ECC4}"/>
+              </a:ext>
+            </a:extLst>
+          </p:cNvPr>
+          <p:cNvSpPr txBox="1"/>
+          <p:nvPr/>
+        </p:nvSpPr>
+        <p:spPr>
+          <a:xfrm>
+            <a:off x="512596" y="1723415"/>
+            <a:ext cx="6084146" cy="4154984"/>
+          </a:xfrm>
+          <a:prstGeom prst="rect">
+            <a:avLst/>
+          </a:prstGeom>
+          <a:noFill/>
+        </p:spPr>
+        <p:txBody>
+          <a:bodyPr wrap="square" rtlCol="0">
+            <a:spAutoFit/>
+          </a:bodyPr>
+          <a:lstStyle/>
+          <a:p>
+            <a:r>
+              <a:rPr lang="en-US" sz="2400" dirty="0">
+                <a:solidFill>
+                  <a:srgbClr val="C100C2"/>
+                </a:solidFill>
+              </a:rPr>
+              <a:t>Data Volume Management: </a:t>
+            </a:r>
+            <a:r>
+              <a:rPr lang="en-US" sz="2400" dirty="0">
+                <a:solidFill>
+                  <a:schemeClr val="tx2"/>
+                </a:solidFill>
+              </a:rPr>
+              <a:t>Plan for growing data through efficient indexing and database partitioning</a:t>
+            </a:r>
+          </a:p>
+          <a:p>
+            <a:endParaRPr lang="en-US" sz="2400" dirty="0">
+              <a:solidFill>
+                <a:schemeClr val="tx2"/>
+              </a:solidFill>
+            </a:endParaRPr>
+          </a:p>
+          <a:p>
+            <a:r>
+              <a:rPr lang="en-US" sz="2400" dirty="0">
+                <a:solidFill>
+                  <a:srgbClr val="C100C2"/>
+                </a:solidFill>
+              </a:rPr>
+              <a:t>Model Serving: </a:t>
+            </a:r>
+            <a:r>
+              <a:rPr lang="en-US" sz="2400" dirty="0">
+                <a:solidFill>
+                  <a:schemeClr val="tx2"/>
+                </a:solidFill>
+              </a:rPr>
+              <a:t>Utilize lightweight models or cloud-based ML services for low latency responses</a:t>
+            </a:r>
+          </a:p>
+          <a:p>
+            <a:endParaRPr lang="en-US" sz="2400" dirty="0">
+              <a:solidFill>
+                <a:schemeClr val="tx2"/>
+              </a:solidFill>
+            </a:endParaRPr>
+          </a:p>
+          <a:p>
+            <a:r>
+              <a:rPr lang="en-US" sz="2400" dirty="0">
+                <a:solidFill>
+                  <a:srgbClr val="C100C2"/>
+                </a:solidFill>
+              </a:rPr>
+              <a:t>Feedback Automation: </a:t>
+            </a:r>
+            <a:r>
+              <a:rPr lang="en-US" sz="2400" dirty="0">
+                <a:solidFill>
+                  <a:schemeClr val="tx2"/>
+                </a:solidFill>
+              </a:rPr>
+              <a:t>Automate retraining with </a:t>
+            </a:r>
+            <a:r>
+              <a:rPr lang="en-US" sz="2400" dirty="0" err="1">
+                <a:solidFill>
+                  <a:schemeClr val="tx2"/>
+                </a:solidFill>
+              </a:rPr>
+              <a:t>MLOps</a:t>
+            </a:r>
+            <a:r>
+              <a:rPr lang="en-US" sz="2400" dirty="0">
+                <a:solidFill>
+                  <a:schemeClr val="tx2"/>
+                </a:solidFill>
+              </a:rPr>
+              <a:t> to continually improve based on user feedback</a:t>
+            </a:r>
+          </a:p>
+        </p:txBody>
+      </p:sp>
+      <p:pic>
+        <p:nvPicPr>
+          <p:cNvPr id="3" name="Picture 2">
+            <a:extLst>
+              <a:ext uri="{FF2B5EF4-FFF2-40B4-BE49-F238E27FC236}">
+                <a16:creationId xmlns:a16="http://schemas.microsoft.com/office/drawing/2014/main" id="{C4BB5FA1-3663-F654-D95C-299E0D38D401}"/>
+              </a:ext>
+            </a:extLst>
+          </p:cNvPr>
+          <p:cNvPicPr>
+            <a:picLocks noChangeAspect="1"/>
+          </p:cNvPicPr>
+          <p:nvPr/>
+        </p:nvPicPr>
+        <p:blipFill>
+          <a:blip r:embed="rId2">
+            <a:extLst>
+              <a:ext uri="{837473B0-CC2E-450A-ABE3-18F120FF3D39}">
+                <a1611:picAttrSrcUrl xmlns:a1611="http://schemas.microsoft.com/office/drawing/2016/11/main" r:id="rId3"/>
+              </a:ext>
+            </a:extLst>
+          </a:blip>
+          <a:stretch>
+            <a:fillRect/>
+          </a:stretch>
+        </p:blipFill>
+        <p:spPr>
+          <a:xfrm flipV="1">
+            <a:off x="7007737" y="1895907"/>
+            <a:ext cx="4303730" cy="3810000"/>
+          </a:xfrm>
+          <a:prstGeom prst="rect">
+            <a:avLst/>
+          </a:prstGeom>
+        </p:spPr>
+      </p:pic>
+    </p:spTree>
+    <p:extLst>
+      <p:ext uri="{BB962C8B-B14F-4D97-AF65-F5344CB8AC3E}">
+        <p14:creationId xmlns:p14="http://schemas.microsoft.com/office/powerpoint/2010/main" val="114822509"/>
+      </p:ext>
+    </p:extLst>
+  </p:cSld>
+  <p:clrMapOvr>
+    <a:masterClrMapping/>
+  </p:clrMapOvr>
+</p:sld>
+</file>
+
+<file path=ppt/slides/slide11.xml><?xml version="1.0" encoding="utf-8"?>
+<p:sld xmlns:a="http://schemas.openxmlformats.org/drawingml/2006/main" xmlns:r="http://schemas.openxmlformats.org/officeDocument/2006/relationships" xmlns:p="http://schemas.openxmlformats.org/presentationml/2006/main">
+  <p:cSld>
+    <p:spTree>
+      <p:nvGrpSpPr>
+        <p:cNvPr id="1" name=""/>
+        <p:cNvGrpSpPr/>
+        <p:nvPr/>
+      </p:nvGrpSpPr>
+      <p:grpSpPr>
+        <a:xfrm>
+          <a:off x="0" y="0"/>
+          <a:ext cx="0" cy="0"/>
+          <a:chOff x="0" y="0"/>
+          <a:chExt cx="0" cy="0"/>
+        </a:xfrm>
+      </p:grpSpPr>
+      <p:sp>
+        <p:nvSpPr>
+          <p:cNvPr id="4" name="TextBox 3">
+            <a:extLst>
+              <a:ext uri="{FF2B5EF4-FFF2-40B4-BE49-F238E27FC236}">
+                <a16:creationId xmlns:a16="http://schemas.microsoft.com/office/drawing/2014/main" id="{F92EF9EB-12F0-D0F0-6B35-506E0AAFE841}"/>
+              </a:ext>
+            </a:extLst>
+          </p:cNvPr>
+          <p:cNvSpPr txBox="1"/>
+          <p:nvPr/>
+        </p:nvSpPr>
+        <p:spPr>
+          <a:xfrm>
+            <a:off x="512596" y="189291"/>
+            <a:ext cx="11679403" cy="707886"/>
+          </a:xfrm>
+          <a:prstGeom prst="rect">
+            <a:avLst/>
+          </a:prstGeom>
+          <a:noFill/>
+        </p:spPr>
+        <p:txBody>
+          <a:bodyPr wrap="square" rtlCol="0">
+            <a:spAutoFit/>
+          </a:bodyPr>
+          <a:lstStyle/>
+          <a:p>
+            <a:r>
+              <a:rPr lang="en-US" sz="4000" dirty="0"/>
+              <a:t>Conclusion – </a:t>
+            </a:r>
+            <a:r>
+              <a:rPr lang="en-US" sz="3000" dirty="0">
+                <a:solidFill>
+                  <a:schemeClr val="accent1"/>
+                </a:solidFill>
+              </a:rPr>
+              <a:t>Summary and Key Takeaway</a:t>
+            </a:r>
+          </a:p>
+        </p:txBody>
+      </p:sp>
+      <p:sp>
+        <p:nvSpPr>
+          <p:cNvPr id="2" name="Rectangle 1">
+            <a:extLst>
+              <a:ext uri="{FF2B5EF4-FFF2-40B4-BE49-F238E27FC236}">
+                <a16:creationId xmlns:a16="http://schemas.microsoft.com/office/drawing/2014/main" id="{2AE523BE-CD0B-320E-4305-D21C181186D4}"/>
+              </a:ext>
+            </a:extLst>
+          </p:cNvPr>
+          <p:cNvSpPr/>
+          <p:nvPr/>
+        </p:nvSpPr>
+        <p:spPr>
+          <a:xfrm>
+            <a:off x="522516" y="1747156"/>
+            <a:ext cx="3412672" cy="4094423"/>
+          </a:xfrm>
+          <a:prstGeom prst="rect">
+            <a:avLst/>
+          </a:prstGeom>
+          <a:noFill/>
+          <a:ln w="9525" cap="flat" cmpd="sng" algn="ctr">
+            <a:solidFill>
+              <a:schemeClr val="accent2"/>
+            </a:solidFill>
+            <a:prstDash val="solid"/>
+            <a:round/>
+            <a:headEnd type="none" w="med" len="med"/>
+            <a:tailEnd type="none" w="med" len="med"/>
+          </a:ln>
+        </p:spPr>
+        <p:style>
+          <a:lnRef idx="0">
+            <a:scrgbClr r="0" g="0" b="0"/>
+          </a:lnRef>
+          <a:fillRef idx="0">
+            <a:scrgbClr r="0" g="0" b="0"/>
+          </a:fillRef>
+          <a:effectRef idx="0">
+            <a:scrgbClr r="0" g="0" b="0"/>
+          </a:effectRef>
+          <a:fontRef idx="minor">
+            <a:schemeClr val="accent2"/>
+          </a:fontRef>
+        </p:style>
+        <p:txBody>
+          <a:bodyPr rtlCol="0" anchor="ctr"/>
+          <a:lstStyle/>
+          <a:p>
+            <a:pPr algn="ctr"/>
+            <a:endParaRPr lang="en-US"/>
+          </a:p>
+        </p:txBody>
+      </p:sp>
+      <p:sp>
+        <p:nvSpPr>
+          <p:cNvPr id="7" name="Rectangle 6">
+            <a:extLst>
+              <a:ext uri="{FF2B5EF4-FFF2-40B4-BE49-F238E27FC236}">
+                <a16:creationId xmlns:a16="http://schemas.microsoft.com/office/drawing/2014/main" id="{4EE718E1-2169-388E-0106-05B4CD1FD9DD}"/>
+              </a:ext>
+            </a:extLst>
+          </p:cNvPr>
+          <p:cNvSpPr/>
+          <p:nvPr/>
+        </p:nvSpPr>
+        <p:spPr>
+          <a:xfrm>
+            <a:off x="4389664" y="1747156"/>
+            <a:ext cx="3412672" cy="4094423"/>
+          </a:xfrm>
+          <a:prstGeom prst="rect">
+            <a:avLst/>
+          </a:prstGeom>
+          <a:noFill/>
+          <a:ln w="9525" cap="flat" cmpd="sng" algn="ctr">
+            <a:solidFill>
+              <a:schemeClr val="accent2"/>
+            </a:solidFill>
+            <a:prstDash val="solid"/>
+            <a:round/>
+            <a:headEnd type="none" w="med" len="med"/>
+            <a:tailEnd type="none" w="med" len="med"/>
+          </a:ln>
+        </p:spPr>
+        <p:style>
+          <a:lnRef idx="0">
+            <a:scrgbClr r="0" g="0" b="0"/>
+          </a:lnRef>
+          <a:fillRef idx="0">
+            <a:scrgbClr r="0" g="0" b="0"/>
+          </a:fillRef>
+          <a:effectRef idx="0">
+            <a:scrgbClr r="0" g="0" b="0"/>
+          </a:effectRef>
+          <a:fontRef idx="minor">
+            <a:schemeClr val="accent2"/>
+          </a:fontRef>
+        </p:style>
+        <p:txBody>
+          <a:bodyPr rtlCol="0" anchor="ctr"/>
+          <a:lstStyle/>
+          <a:p>
+            <a:pPr algn="ctr"/>
+            <a:endParaRPr lang="en-US"/>
+          </a:p>
+        </p:txBody>
+      </p:sp>
+      <p:sp>
+        <p:nvSpPr>
+          <p:cNvPr id="9" name="Rectangle 8">
+            <a:extLst>
+              <a:ext uri="{FF2B5EF4-FFF2-40B4-BE49-F238E27FC236}">
+                <a16:creationId xmlns:a16="http://schemas.microsoft.com/office/drawing/2014/main" id="{B3FFF479-5C97-ED91-F3E6-25C28ECC500A}"/>
+              </a:ext>
+            </a:extLst>
+          </p:cNvPr>
+          <p:cNvSpPr/>
+          <p:nvPr/>
+        </p:nvSpPr>
+        <p:spPr>
+          <a:xfrm>
+            <a:off x="8256812" y="1747156"/>
+            <a:ext cx="3412672" cy="4094423"/>
+          </a:xfrm>
+          <a:prstGeom prst="rect">
+            <a:avLst/>
+          </a:prstGeom>
+          <a:noFill/>
+          <a:ln w="9525" cap="flat" cmpd="sng" algn="ctr">
+            <a:solidFill>
+              <a:schemeClr val="accent2"/>
+            </a:solidFill>
+            <a:prstDash val="solid"/>
+            <a:round/>
+            <a:headEnd type="none" w="med" len="med"/>
+            <a:tailEnd type="none" w="med" len="med"/>
+          </a:ln>
+        </p:spPr>
+        <p:style>
+          <a:lnRef idx="0">
+            <a:scrgbClr r="0" g="0" b="0"/>
+          </a:lnRef>
+          <a:fillRef idx="0">
+            <a:scrgbClr r="0" g="0" b="0"/>
+          </a:fillRef>
+          <a:effectRef idx="0">
+            <a:scrgbClr r="0" g="0" b="0"/>
+          </a:effectRef>
+          <a:fontRef idx="minor">
+            <a:schemeClr val="accent2"/>
+          </a:fontRef>
+        </p:style>
+        <p:txBody>
+          <a:bodyPr rtlCol="0" anchor="ctr"/>
+          <a:lstStyle/>
+          <a:p>
+            <a:pPr algn="ctr"/>
+            <a:endParaRPr lang="en-US"/>
+          </a:p>
+        </p:txBody>
+      </p:sp>
+      <p:sp>
+        <p:nvSpPr>
+          <p:cNvPr id="10" name="TextBox 9">
+            <a:extLst>
+              <a:ext uri="{FF2B5EF4-FFF2-40B4-BE49-F238E27FC236}">
+                <a16:creationId xmlns:a16="http://schemas.microsoft.com/office/drawing/2014/main" id="{1AFF6039-90E7-4854-03CC-534D0FBF99BD}"/>
+              </a:ext>
+            </a:extLst>
+          </p:cNvPr>
+          <p:cNvSpPr txBox="1"/>
+          <p:nvPr/>
+        </p:nvSpPr>
+        <p:spPr>
+          <a:xfrm>
+            <a:off x="522517" y="3445329"/>
+            <a:ext cx="3412672" cy="2277547"/>
+          </a:xfrm>
+          <a:prstGeom prst="rect">
+            <a:avLst/>
+          </a:prstGeom>
+          <a:noFill/>
+        </p:spPr>
+        <p:txBody>
+          <a:bodyPr wrap="square" rtlCol="0">
+            <a:spAutoFit/>
+          </a:bodyPr>
+          <a:lstStyle/>
+          <a:p>
+            <a:pPr algn="ctr"/>
+            <a:r>
+              <a:rPr lang="en-US" sz="2400" b="1" dirty="0"/>
+              <a:t>Summary of Roadmap</a:t>
+            </a:r>
+          </a:p>
+          <a:p>
+            <a:pPr algn="ctr"/>
+            <a:endParaRPr lang="en-US" dirty="0"/>
+          </a:p>
+          <a:p>
+            <a:pPr algn="ctr"/>
+            <a:r>
+              <a:rPr lang="en-US" sz="2000" dirty="0"/>
+              <a:t>A structured step-by-step</a:t>
+            </a:r>
+          </a:p>
+          <a:p>
+            <a:pPr algn="ctr"/>
+            <a:r>
+              <a:rPr lang="en-US" sz="2000" dirty="0"/>
+              <a:t>Approach focused on accuracy, scalability and continuous improvement through feedback</a:t>
+            </a:r>
+          </a:p>
+        </p:txBody>
+      </p:sp>
+      <p:sp>
+        <p:nvSpPr>
+          <p:cNvPr id="11" name="TextBox 10">
+            <a:extLst>
+              <a:ext uri="{FF2B5EF4-FFF2-40B4-BE49-F238E27FC236}">
+                <a16:creationId xmlns:a16="http://schemas.microsoft.com/office/drawing/2014/main" id="{F3025C87-C573-746E-6C30-C7E77C64AC01}"/>
+              </a:ext>
+            </a:extLst>
+          </p:cNvPr>
+          <p:cNvSpPr txBox="1"/>
+          <p:nvPr/>
+        </p:nvSpPr>
+        <p:spPr>
+          <a:xfrm>
+            <a:off x="4389663" y="3502477"/>
+            <a:ext cx="3412672" cy="2339102"/>
+          </a:xfrm>
+          <a:prstGeom prst="rect">
+            <a:avLst/>
+          </a:prstGeom>
+          <a:noFill/>
+        </p:spPr>
+        <p:txBody>
+          <a:bodyPr wrap="square" rtlCol="0">
+            <a:spAutoFit/>
+          </a:bodyPr>
+          <a:lstStyle/>
+          <a:p>
+            <a:pPr algn="ctr"/>
+            <a:r>
+              <a:rPr lang="en-US" sz="2400" b="1" dirty="0"/>
+              <a:t>Scalability and Adaptability</a:t>
+            </a:r>
+          </a:p>
+          <a:p>
+            <a:pPr algn="ctr"/>
+            <a:endParaRPr lang="en-US" dirty="0"/>
+          </a:p>
+          <a:p>
+            <a:pPr algn="ctr"/>
+            <a:r>
+              <a:rPr lang="en-US" sz="2000" dirty="0"/>
+              <a:t>The service architecture supports growth, with model retraining to adapt to evolving transaction pattern</a:t>
+            </a:r>
+          </a:p>
+        </p:txBody>
+      </p:sp>
+      <p:sp>
+        <p:nvSpPr>
+          <p:cNvPr id="12" name="TextBox 11">
+            <a:extLst>
+              <a:ext uri="{FF2B5EF4-FFF2-40B4-BE49-F238E27FC236}">
+                <a16:creationId xmlns:a16="http://schemas.microsoft.com/office/drawing/2014/main" id="{B123C338-A60E-51ED-2EBA-F78215AD4171}"/>
+              </a:ext>
+            </a:extLst>
+          </p:cNvPr>
+          <p:cNvSpPr txBox="1"/>
+          <p:nvPr/>
+        </p:nvSpPr>
+        <p:spPr>
+          <a:xfrm>
+            <a:off x="8256809" y="3559625"/>
+            <a:ext cx="3412672" cy="2031325"/>
+          </a:xfrm>
+          <a:prstGeom prst="rect">
+            <a:avLst/>
+          </a:prstGeom>
+          <a:noFill/>
+        </p:spPr>
+        <p:txBody>
+          <a:bodyPr wrap="square" rtlCol="0">
+            <a:spAutoFit/>
+          </a:bodyPr>
+          <a:lstStyle/>
+          <a:p>
+            <a:pPr algn="ctr"/>
+            <a:r>
+              <a:rPr lang="en-US" sz="2400" b="1" dirty="0"/>
+              <a:t>Performance Optimization</a:t>
+            </a:r>
+          </a:p>
+          <a:p>
+            <a:pPr algn="ctr"/>
+            <a:endParaRPr lang="en-US" dirty="0"/>
+          </a:p>
+          <a:p>
+            <a:pPr algn="ctr"/>
+            <a:r>
+              <a:rPr lang="en-US" sz="2000" dirty="0"/>
+              <a:t>Emphasis on caching and feedback-driven updates to ensure robustness</a:t>
+            </a:r>
+          </a:p>
+        </p:txBody>
+      </p:sp>
+      <p:pic>
+        <p:nvPicPr>
+          <p:cNvPr id="16" name="Graphic 15" descr="Upward trend">
+            <a:extLst>
+              <a:ext uri="{FF2B5EF4-FFF2-40B4-BE49-F238E27FC236}">
+                <a16:creationId xmlns:a16="http://schemas.microsoft.com/office/drawing/2014/main" id="{E0B420EA-3E2A-8066-3C97-61FEB9790998}"/>
+              </a:ext>
+            </a:extLst>
+          </p:cNvPr>
+          <p:cNvPicPr>
+            <a:picLocks noChangeAspect="1"/>
+          </p:cNvPicPr>
+          <p:nvPr/>
+        </p:nvPicPr>
+        <p:blipFill>
+          <a:blip r:embed="rId2">
+            <a:extLst>
+              <a:ext uri="{96DAC541-7B7A-43D3-8B79-37D633B846F1}">
+                <asvg:svgBlip xmlns:asvg="http://schemas.microsoft.com/office/drawing/2016/SVG/main" r:embed="rId3"/>
+              </a:ext>
+            </a:extLst>
+          </a:blip>
+          <a:stretch>
+            <a:fillRect/>
+          </a:stretch>
+        </p:blipFill>
+        <p:spPr>
+          <a:xfrm>
+            <a:off x="5638799" y="2195298"/>
+            <a:ext cx="914400" cy="914400"/>
+          </a:xfrm>
+          <a:prstGeom prst="rect">
+            <a:avLst/>
+          </a:prstGeom>
+        </p:spPr>
+      </p:pic>
+      <p:pic>
+        <p:nvPicPr>
+          <p:cNvPr id="18" name="Graphic 17" descr="Send">
+            <a:extLst>
+              <a:ext uri="{FF2B5EF4-FFF2-40B4-BE49-F238E27FC236}">
+                <a16:creationId xmlns:a16="http://schemas.microsoft.com/office/drawing/2014/main" id="{7544816A-BBB0-464E-999C-3D26431D595C}"/>
+              </a:ext>
+            </a:extLst>
+          </p:cNvPr>
+          <p:cNvPicPr>
+            <a:picLocks noChangeAspect="1"/>
+          </p:cNvPicPr>
+          <p:nvPr/>
+        </p:nvPicPr>
+        <p:blipFill>
+          <a:blip r:embed="rId4">
+            <a:extLst>
+              <a:ext uri="{96DAC541-7B7A-43D3-8B79-37D633B846F1}">
+                <asvg:svgBlip xmlns:asvg="http://schemas.microsoft.com/office/drawing/2016/SVG/main" r:embed="rId5"/>
+              </a:ext>
+            </a:extLst>
+          </a:blip>
+          <a:stretch>
+            <a:fillRect/>
+          </a:stretch>
+        </p:blipFill>
+        <p:spPr>
+          <a:xfrm>
+            <a:off x="9505945" y="2195298"/>
+            <a:ext cx="914400" cy="914400"/>
+          </a:xfrm>
+          <a:prstGeom prst="rect">
+            <a:avLst/>
+          </a:prstGeom>
+        </p:spPr>
+      </p:pic>
+      <p:pic>
+        <p:nvPicPr>
+          <p:cNvPr id="20" name="Graphic 19" descr="Globe">
+            <a:extLst>
+              <a:ext uri="{FF2B5EF4-FFF2-40B4-BE49-F238E27FC236}">
+                <a16:creationId xmlns:a16="http://schemas.microsoft.com/office/drawing/2014/main" id="{BCAFC771-5CCB-3558-E060-F9313331C745}"/>
+              </a:ext>
+            </a:extLst>
+          </p:cNvPr>
+          <p:cNvPicPr>
+            <a:picLocks noChangeAspect="1"/>
+          </p:cNvPicPr>
+          <p:nvPr/>
+        </p:nvPicPr>
+        <p:blipFill>
+          <a:blip r:embed="rId6">
+            <a:extLst>
+              <a:ext uri="{96DAC541-7B7A-43D3-8B79-37D633B846F1}">
+                <asvg:svgBlip xmlns:asvg="http://schemas.microsoft.com/office/drawing/2016/SVG/main" r:embed="rId7"/>
+              </a:ext>
+            </a:extLst>
+          </a:blip>
+          <a:stretch>
+            <a:fillRect/>
+          </a:stretch>
+        </p:blipFill>
+        <p:spPr>
+          <a:xfrm>
+            <a:off x="1771652" y="2198021"/>
+            <a:ext cx="914400" cy="914400"/>
+          </a:xfrm>
+          <a:prstGeom prst="rect">
+            <a:avLst/>
+          </a:prstGeom>
+        </p:spPr>
+      </p:pic>
+    </p:spTree>
+    <p:extLst>
+      <p:ext uri="{BB962C8B-B14F-4D97-AF65-F5344CB8AC3E}">
+        <p14:creationId xmlns:p14="http://schemas.microsoft.com/office/powerpoint/2010/main" val="741136792"/>
+      </p:ext>
+    </p:extLst>
+  </p:cSld>
+  <p:clrMapOvr>
+    <a:masterClrMapping/>
+  </p:clrMapOvr>
+</p:sld>
+</file>
+
 <file path=ppt/slides/slide2.xml><?xml version="1.0" encoding="utf-8"?>
 <p:sld xmlns:a="http://schemas.openxmlformats.org/drawingml/2006/main" xmlns:r="http://schemas.openxmlformats.org/officeDocument/2006/relationships" xmlns:p="http://schemas.openxmlformats.org/presentationml/2006/main">
   <p:cSld>
@@ -6623,8 +7341,8 @@
         </p:nvSpPr>
         <p:spPr>
           <a:xfrm>
-            <a:off x="512596" y="1592844"/>
-            <a:ext cx="4859383" cy="6740307"/>
+            <a:off x="479939" y="1108554"/>
+            <a:ext cx="5343918" cy="5632311"/>
           </a:xfrm>
           <a:prstGeom prst="rect">
             <a:avLst/>
@@ -6684,28 +7402,8 @@
                   <a:schemeClr val="tx2"/>
                 </a:solidFill>
               </a:rPr>
-              <a:t>At this stage, we perform preliminary model training using basic categorization technique and ML models. We can begin training with models like Naïve Bayes and Decision Trees, then consider advanced models </a:t>
-            </a:r>
-            <a:r>
-              <a:rPr lang="en-US" sz="2400">
-                <a:solidFill>
-                  <a:schemeClr val="tx2"/>
-                </a:solidFill>
-              </a:rPr>
-              <a:t>like Transformers</a:t>
-            </a:r>
-            <a:endParaRPr lang="en-US" sz="2400" dirty="0">
-              <a:solidFill>
-                <a:schemeClr val="tx2"/>
-              </a:solidFill>
-            </a:endParaRPr>
-          </a:p>
-          <a:p>
-            <a:endParaRPr lang="en-US" sz="2400" dirty="0">
-              <a:solidFill>
-                <a:schemeClr val="tx2"/>
-              </a:solidFill>
-            </a:endParaRPr>
+              <a:t>At this stage, we perform preliminary model training using basic categorization technique and ML models. We can begin training with models like Naïve Bayes and Decision Trees, then consider advanced models like Transformers</a:t>
+            </a:r>
           </a:p>
         </p:txBody>
       </p:sp>
@@ -6737,8 +7435,8 @@
         </p:blipFill>
         <p:spPr>
           <a:xfrm>
-            <a:off x="5823857" y="1793966"/>
-            <a:ext cx="5626947" cy="4064000"/>
+            <a:off x="6237514" y="1793966"/>
+            <a:ext cx="5213290" cy="4064000"/>
           </a:xfrm>
           <a:prstGeom prst="rect">
             <a:avLst/>
@@ -6805,15 +7503,7 @@
           <a:p>
             <a:r>
               <a:rPr lang="en-US" sz="4000" dirty="0"/>
-              <a:t>Implementation Plan </a:t>
-            </a:r>
-            <a:r>
-              <a:rPr lang="en-US" sz="4000" dirty="0" err="1"/>
-              <a:t>Contd</a:t>
-            </a:r>
-            <a:r>
-              <a:rPr lang="en-US" sz="4000" dirty="0"/>
-              <a:t> – </a:t>
+              <a:t>Implementation Plan Cont’d – </a:t>
             </a:r>
             <a:r>
               <a:rPr lang="en-US" sz="3000" dirty="0">
@@ -6953,6 +7643,696 @@
     <p:extLst>
       <p:ext uri="{BB962C8B-B14F-4D97-AF65-F5344CB8AC3E}">
         <p14:creationId xmlns:p14="http://schemas.microsoft.com/office/powerpoint/2010/main" val="1165039802"/>
+      </p:ext>
+    </p:extLst>
+  </p:cSld>
+  <p:clrMapOvr>
+    <a:masterClrMapping/>
+  </p:clrMapOvr>
+</p:sld>
+</file>
+
+<file path=ppt/slides/slide7.xml><?xml version="1.0" encoding="utf-8"?>
+<p:sld xmlns:a="http://schemas.openxmlformats.org/drawingml/2006/main" xmlns:r="http://schemas.openxmlformats.org/officeDocument/2006/relationships" xmlns:p="http://schemas.openxmlformats.org/presentationml/2006/main">
+  <p:cSld>
+    <p:spTree>
+      <p:nvGrpSpPr>
+        <p:cNvPr id="1" name=""/>
+        <p:cNvGrpSpPr/>
+        <p:nvPr/>
+      </p:nvGrpSpPr>
+      <p:grpSpPr>
+        <a:xfrm>
+          <a:off x="0" y="0"/>
+          <a:ext cx="0" cy="0"/>
+          <a:chOff x="0" y="0"/>
+          <a:chExt cx="0" cy="0"/>
+        </a:xfrm>
+      </p:grpSpPr>
+      <p:sp>
+        <p:nvSpPr>
+          <p:cNvPr id="4" name="TextBox 3">
+            <a:extLst>
+              <a:ext uri="{FF2B5EF4-FFF2-40B4-BE49-F238E27FC236}">
+                <a16:creationId xmlns:a16="http://schemas.microsoft.com/office/drawing/2014/main" id="{F92EF9EB-12F0-D0F0-6B35-506E0AAFE841}"/>
+              </a:ext>
+            </a:extLst>
+          </p:cNvPr>
+          <p:cNvSpPr txBox="1"/>
+          <p:nvPr/>
+        </p:nvSpPr>
+        <p:spPr>
+          <a:xfrm>
+            <a:off x="741196" y="270934"/>
+            <a:ext cx="11450803" cy="707886"/>
+          </a:xfrm>
+          <a:prstGeom prst="rect">
+            <a:avLst/>
+          </a:prstGeom>
+          <a:noFill/>
+        </p:spPr>
+        <p:txBody>
+          <a:bodyPr wrap="square" rtlCol="0">
+            <a:spAutoFit/>
+          </a:bodyPr>
+          <a:lstStyle/>
+          <a:p>
+            <a:r>
+              <a:rPr lang="en-US" sz="4000" dirty="0"/>
+              <a:t>Data Ingestion, Processing and Labelling</a:t>
+            </a:r>
+            <a:endParaRPr lang="en-US" sz="3000" dirty="0">
+              <a:solidFill>
+                <a:schemeClr val="accent1"/>
+              </a:solidFill>
+            </a:endParaRPr>
+          </a:p>
+        </p:txBody>
+      </p:sp>
+      <p:pic>
+        <p:nvPicPr>
+          <p:cNvPr id="3" name="Picture 2">
+            <a:extLst>
+              <a:ext uri="{FF2B5EF4-FFF2-40B4-BE49-F238E27FC236}">
+                <a16:creationId xmlns:a16="http://schemas.microsoft.com/office/drawing/2014/main" id="{3CC52934-E04A-A2E2-EDCB-46448E1BE088}"/>
+              </a:ext>
+            </a:extLst>
+          </p:cNvPr>
+          <p:cNvPicPr>
+            <a:picLocks noChangeAspect="1"/>
+          </p:cNvPicPr>
+          <p:nvPr/>
+        </p:nvPicPr>
+        <p:blipFill>
+          <a:blip r:embed="rId2"/>
+          <a:stretch>
+            <a:fillRect/>
+          </a:stretch>
+        </p:blipFill>
+        <p:spPr>
+          <a:xfrm>
+            <a:off x="1" y="1094014"/>
+            <a:ext cx="12191998" cy="5763986"/>
+          </a:xfrm>
+          <a:prstGeom prst="rect">
+            <a:avLst/>
+          </a:prstGeom>
+        </p:spPr>
+      </p:pic>
+    </p:spTree>
+    <p:extLst>
+      <p:ext uri="{BB962C8B-B14F-4D97-AF65-F5344CB8AC3E}">
+        <p14:creationId xmlns:p14="http://schemas.microsoft.com/office/powerpoint/2010/main" val="2504352579"/>
+      </p:ext>
+    </p:extLst>
+  </p:cSld>
+  <p:clrMapOvr>
+    <a:masterClrMapping/>
+  </p:clrMapOvr>
+</p:sld>
+</file>
+
+<file path=ppt/slides/slide8.xml><?xml version="1.0" encoding="utf-8"?>
+<p:sld xmlns:a="http://schemas.openxmlformats.org/drawingml/2006/main" xmlns:r="http://schemas.openxmlformats.org/officeDocument/2006/relationships" xmlns:p="http://schemas.openxmlformats.org/presentationml/2006/main">
+  <p:cSld>
+    <p:spTree>
+      <p:nvGrpSpPr>
+        <p:cNvPr id="1" name=""/>
+        <p:cNvGrpSpPr/>
+        <p:nvPr/>
+      </p:nvGrpSpPr>
+      <p:grpSpPr>
+        <a:xfrm>
+          <a:off x="0" y="0"/>
+          <a:ext cx="0" cy="0"/>
+          <a:chOff x="0" y="0"/>
+          <a:chExt cx="0" cy="0"/>
+        </a:xfrm>
+      </p:grpSpPr>
+      <p:sp>
+        <p:nvSpPr>
+          <p:cNvPr id="4" name="TextBox 3">
+            <a:extLst>
+              <a:ext uri="{FF2B5EF4-FFF2-40B4-BE49-F238E27FC236}">
+                <a16:creationId xmlns:a16="http://schemas.microsoft.com/office/drawing/2014/main" id="{F92EF9EB-12F0-D0F0-6B35-506E0AAFE841}"/>
+              </a:ext>
+            </a:extLst>
+          </p:cNvPr>
+          <p:cNvSpPr txBox="1"/>
+          <p:nvPr/>
+        </p:nvSpPr>
+        <p:spPr>
+          <a:xfrm>
+            <a:off x="512596" y="189291"/>
+            <a:ext cx="11679403" cy="1169551"/>
+          </a:xfrm>
+          <a:prstGeom prst="rect">
+            <a:avLst/>
+          </a:prstGeom>
+          <a:noFill/>
+        </p:spPr>
+        <p:txBody>
+          <a:bodyPr wrap="square" rtlCol="0">
+            <a:spAutoFit/>
+          </a:bodyPr>
+          <a:lstStyle/>
+          <a:p>
+            <a:r>
+              <a:rPr lang="en-US" sz="4000" dirty="0"/>
+              <a:t>Backend Architecture &amp; Data Schema – </a:t>
+            </a:r>
+            <a:r>
+              <a:rPr lang="en-US" sz="3000" dirty="0">
+                <a:solidFill>
+                  <a:schemeClr val="accent1"/>
+                </a:solidFill>
+              </a:rPr>
+              <a:t>Database &amp; System Components</a:t>
+            </a:r>
+          </a:p>
+        </p:txBody>
+      </p:sp>
+      <p:sp>
+        <p:nvSpPr>
+          <p:cNvPr id="8" name="TextBox 7">
+            <a:extLst>
+              <a:ext uri="{FF2B5EF4-FFF2-40B4-BE49-F238E27FC236}">
+                <a16:creationId xmlns:a16="http://schemas.microsoft.com/office/drawing/2014/main" id="{ED376AD0-796C-AD83-5F7D-4B8802D7ECC4}"/>
+              </a:ext>
+            </a:extLst>
+          </p:cNvPr>
+          <p:cNvSpPr txBox="1"/>
+          <p:nvPr/>
+        </p:nvSpPr>
+        <p:spPr>
+          <a:xfrm>
+            <a:off x="512597" y="1367815"/>
+            <a:ext cx="6084146" cy="5632311"/>
+          </a:xfrm>
+          <a:prstGeom prst="rect">
+            <a:avLst/>
+          </a:prstGeom>
+          <a:noFill/>
+        </p:spPr>
+        <p:txBody>
+          <a:bodyPr wrap="square" rtlCol="0">
+            <a:spAutoFit/>
+          </a:bodyPr>
+          <a:lstStyle/>
+          <a:p>
+            <a:r>
+              <a:rPr lang="en-US" sz="2400" dirty="0">
+                <a:solidFill>
+                  <a:srgbClr val="C100C2"/>
+                </a:solidFill>
+              </a:rPr>
+              <a:t>Data Schema: </a:t>
+            </a:r>
+          </a:p>
+          <a:p>
+            <a:pPr marL="342900" indent="-342900">
+              <a:buFont typeface="Arial" panose="020B0604020202020204" pitchFamily="34" charset="0"/>
+              <a:buChar char="•"/>
+            </a:pPr>
+            <a:r>
+              <a:rPr lang="en-US" sz="2200" b="1" dirty="0">
+                <a:solidFill>
+                  <a:schemeClr val="tx2"/>
+                </a:solidFill>
+              </a:rPr>
+              <a:t>Transaction Table:</a:t>
+            </a:r>
+            <a:r>
+              <a:rPr lang="en-US" sz="2200" dirty="0">
+                <a:solidFill>
+                  <a:schemeClr val="tx2"/>
+                </a:solidFill>
+              </a:rPr>
+              <a:t> includes fields like </a:t>
+            </a:r>
+            <a:r>
+              <a:rPr lang="en-US" sz="2200" dirty="0" err="1">
+                <a:solidFill>
+                  <a:schemeClr val="tx2"/>
+                </a:solidFill>
+              </a:rPr>
+              <a:t>transactionId</a:t>
+            </a:r>
+            <a:r>
+              <a:rPr lang="en-US" sz="2200" dirty="0">
+                <a:solidFill>
+                  <a:schemeClr val="tx2"/>
+                </a:solidFill>
+              </a:rPr>
+              <a:t>, amount, accounts, </a:t>
+            </a:r>
+            <a:r>
+              <a:rPr lang="en-US" sz="2200" b="1" dirty="0">
+                <a:solidFill>
+                  <a:schemeClr val="tx2"/>
+                </a:solidFill>
+              </a:rPr>
+              <a:t>narration, </a:t>
+            </a:r>
+            <a:r>
+              <a:rPr lang="en-US" sz="2200" dirty="0">
+                <a:solidFill>
+                  <a:schemeClr val="tx2"/>
+                </a:solidFill>
+              </a:rPr>
+              <a:t>timestamp, location, label etc.</a:t>
+            </a:r>
+          </a:p>
+          <a:p>
+            <a:pPr marL="342900" indent="-342900">
+              <a:buFont typeface="Arial" panose="020B0604020202020204" pitchFamily="34" charset="0"/>
+              <a:buChar char="•"/>
+            </a:pPr>
+            <a:r>
+              <a:rPr lang="en-US" sz="2200" b="1" dirty="0">
+                <a:solidFill>
+                  <a:schemeClr val="tx2"/>
+                </a:solidFill>
+              </a:rPr>
+              <a:t>Feedback Table: </a:t>
+            </a:r>
+            <a:r>
+              <a:rPr lang="en-US" sz="2200" dirty="0">
+                <a:solidFill>
+                  <a:schemeClr val="tx2"/>
+                </a:solidFill>
+              </a:rPr>
+              <a:t>Track user feedback with fields like </a:t>
+            </a:r>
+            <a:r>
+              <a:rPr lang="en-US" sz="2200" dirty="0" err="1">
+                <a:solidFill>
+                  <a:schemeClr val="tx2"/>
+                </a:solidFill>
+              </a:rPr>
+              <a:t>feedbackId</a:t>
+            </a:r>
+            <a:r>
+              <a:rPr lang="en-US" sz="2200" dirty="0">
+                <a:solidFill>
+                  <a:schemeClr val="tx2"/>
+                </a:solidFill>
+              </a:rPr>
+              <a:t>, </a:t>
+            </a:r>
+            <a:r>
+              <a:rPr lang="en-US" sz="2200" dirty="0" err="1">
+                <a:solidFill>
+                  <a:schemeClr val="tx2"/>
+                </a:solidFill>
+              </a:rPr>
+              <a:t>transactionId</a:t>
+            </a:r>
+            <a:r>
+              <a:rPr lang="en-US" sz="2200" dirty="0">
+                <a:solidFill>
+                  <a:schemeClr val="tx2"/>
+                </a:solidFill>
+              </a:rPr>
+              <a:t>, </a:t>
+            </a:r>
+            <a:r>
+              <a:rPr lang="en-US" sz="2200" dirty="0" err="1">
+                <a:solidFill>
+                  <a:schemeClr val="tx2"/>
+                </a:solidFill>
+              </a:rPr>
+              <a:t>originalLabel</a:t>
+            </a:r>
+            <a:r>
+              <a:rPr lang="en-US" sz="2200" dirty="0">
+                <a:solidFill>
+                  <a:schemeClr val="tx2"/>
+                </a:solidFill>
+              </a:rPr>
+              <a:t>, </a:t>
+            </a:r>
+            <a:r>
+              <a:rPr lang="en-US" sz="2200" dirty="0" err="1">
+                <a:solidFill>
+                  <a:schemeClr val="tx2"/>
+                </a:solidFill>
+              </a:rPr>
+              <a:t>correctedLabel</a:t>
+            </a:r>
+            <a:r>
+              <a:rPr lang="en-US" sz="2200" dirty="0">
+                <a:solidFill>
+                  <a:schemeClr val="tx2"/>
+                </a:solidFill>
+              </a:rPr>
+              <a:t> and timestamp</a:t>
+            </a:r>
+            <a:endParaRPr lang="en-US" sz="2200" b="1" dirty="0">
+              <a:solidFill>
+                <a:schemeClr val="tx2"/>
+              </a:solidFill>
+            </a:endParaRPr>
+          </a:p>
+          <a:p>
+            <a:endParaRPr lang="en-US" sz="2400" dirty="0">
+              <a:solidFill>
+                <a:schemeClr val="tx2"/>
+              </a:solidFill>
+            </a:endParaRPr>
+          </a:p>
+          <a:p>
+            <a:r>
+              <a:rPr lang="en-US" sz="2400" dirty="0">
+                <a:solidFill>
+                  <a:srgbClr val="C100C2"/>
+                </a:solidFill>
+              </a:rPr>
+              <a:t>System Components: </a:t>
+            </a:r>
+          </a:p>
+          <a:p>
+            <a:pPr marL="342900" indent="-342900">
+              <a:buFont typeface="Arial" panose="020B0604020202020204" pitchFamily="34" charset="0"/>
+              <a:buChar char="•"/>
+            </a:pPr>
+            <a:r>
+              <a:rPr lang="en-US" sz="2200" dirty="0">
+                <a:solidFill>
+                  <a:schemeClr val="tx2"/>
+                </a:solidFill>
+              </a:rPr>
+              <a:t>Apache Kafka for asynchronous data processing and near-</a:t>
+            </a:r>
+            <a:r>
+              <a:rPr lang="en-US" sz="2200" dirty="0" err="1">
+                <a:solidFill>
+                  <a:schemeClr val="tx2"/>
+                </a:solidFill>
+              </a:rPr>
+              <a:t>realtime</a:t>
+            </a:r>
+            <a:r>
+              <a:rPr lang="en-US" sz="2200" dirty="0">
+                <a:solidFill>
+                  <a:schemeClr val="tx2"/>
+                </a:solidFill>
+              </a:rPr>
+              <a:t> data processing and response</a:t>
+            </a:r>
+          </a:p>
+          <a:p>
+            <a:endParaRPr lang="en-US" sz="2200" dirty="0">
+              <a:solidFill>
+                <a:schemeClr val="tx2"/>
+              </a:solidFill>
+            </a:endParaRPr>
+          </a:p>
+          <a:p>
+            <a:pPr marL="342900" indent="-342900">
+              <a:buFont typeface="Arial" panose="020B0604020202020204" pitchFamily="34" charset="0"/>
+              <a:buChar char="•"/>
+            </a:pPr>
+            <a:r>
+              <a:rPr lang="en-US" sz="2200" dirty="0">
+                <a:solidFill>
+                  <a:schemeClr val="tx2"/>
+                </a:solidFill>
+              </a:rPr>
+              <a:t>API Gateway for data ingestion, ML Service for Labelling, Feedback and Re-training Pipeline for accuracy improvement.</a:t>
+            </a:r>
+          </a:p>
+          <a:p>
+            <a:endParaRPr lang="en-US" sz="2400" dirty="0">
+              <a:solidFill>
+                <a:schemeClr val="tx2"/>
+              </a:solidFill>
+            </a:endParaRPr>
+          </a:p>
+        </p:txBody>
+      </p:sp>
+      <p:pic>
+        <p:nvPicPr>
+          <p:cNvPr id="3" name="Picture 2">
+            <a:extLst>
+              <a:ext uri="{FF2B5EF4-FFF2-40B4-BE49-F238E27FC236}">
+                <a16:creationId xmlns:a16="http://schemas.microsoft.com/office/drawing/2014/main" id="{A32B5D42-C987-3F3B-A43C-50854E50ACA2}"/>
+              </a:ext>
+            </a:extLst>
+          </p:cNvPr>
+          <p:cNvPicPr>
+            <a:picLocks noChangeAspect="1"/>
+          </p:cNvPicPr>
+          <p:nvPr/>
+        </p:nvPicPr>
+        <p:blipFill>
+          <a:blip r:embed="rId2">
+            <a:extLst>
+              <a:ext uri="{837473B0-CC2E-450A-ABE3-18F120FF3D39}">
+                <a1611:picAttrSrcUrl xmlns:a1611="http://schemas.microsoft.com/office/drawing/2016/11/main" r:id="rId3"/>
+              </a:ext>
+            </a:extLst>
+          </a:blip>
+          <a:stretch>
+            <a:fillRect/>
+          </a:stretch>
+        </p:blipFill>
+        <p:spPr>
+          <a:xfrm>
+            <a:off x="6809015" y="1707144"/>
+            <a:ext cx="4870388" cy="4064000"/>
+          </a:xfrm>
+          <a:prstGeom prst="rect">
+            <a:avLst/>
+          </a:prstGeom>
+        </p:spPr>
+      </p:pic>
+    </p:spTree>
+    <p:extLst>
+      <p:ext uri="{BB962C8B-B14F-4D97-AF65-F5344CB8AC3E}">
+        <p14:creationId xmlns:p14="http://schemas.microsoft.com/office/powerpoint/2010/main" val="2061118258"/>
+      </p:ext>
+    </p:extLst>
+  </p:cSld>
+  <p:clrMapOvr>
+    <a:masterClrMapping/>
+  </p:clrMapOvr>
+</p:sld>
+</file>
+
+<file path=ppt/slides/slide9.xml><?xml version="1.0" encoding="utf-8"?>
+<p:sld xmlns:a="http://schemas.openxmlformats.org/drawingml/2006/main" xmlns:r="http://schemas.openxmlformats.org/officeDocument/2006/relationships" xmlns:p="http://schemas.openxmlformats.org/presentationml/2006/main">
+  <p:cSld>
+    <p:spTree>
+      <p:nvGrpSpPr>
+        <p:cNvPr id="1" name=""/>
+        <p:cNvGrpSpPr/>
+        <p:nvPr/>
+      </p:nvGrpSpPr>
+      <p:grpSpPr>
+        <a:xfrm>
+          <a:off x="0" y="0"/>
+          <a:ext cx="0" cy="0"/>
+          <a:chOff x="0" y="0"/>
+          <a:chExt cx="0" cy="0"/>
+        </a:xfrm>
+      </p:grpSpPr>
+      <p:sp>
+        <p:nvSpPr>
+          <p:cNvPr id="4" name="TextBox 3">
+            <a:extLst>
+              <a:ext uri="{FF2B5EF4-FFF2-40B4-BE49-F238E27FC236}">
+                <a16:creationId xmlns:a16="http://schemas.microsoft.com/office/drawing/2014/main" id="{F92EF9EB-12F0-D0F0-6B35-506E0AAFE841}"/>
+              </a:ext>
+            </a:extLst>
+          </p:cNvPr>
+          <p:cNvSpPr txBox="1"/>
+          <p:nvPr/>
+        </p:nvSpPr>
+        <p:spPr>
+          <a:xfrm>
+            <a:off x="512596" y="189291"/>
+            <a:ext cx="11679403" cy="707886"/>
+          </a:xfrm>
+          <a:prstGeom prst="rect">
+            <a:avLst/>
+          </a:prstGeom>
+          <a:noFill/>
+        </p:spPr>
+        <p:txBody>
+          <a:bodyPr wrap="square" rtlCol="0">
+            <a:spAutoFit/>
+          </a:bodyPr>
+          <a:lstStyle/>
+          <a:p>
+            <a:r>
+              <a:rPr lang="en-US" sz="4000" dirty="0"/>
+              <a:t>Metrics &amp; Evaluation Criteria – </a:t>
+            </a:r>
+            <a:r>
+              <a:rPr lang="en-US" sz="3000" dirty="0">
+                <a:solidFill>
+                  <a:schemeClr val="accent1"/>
+                </a:solidFill>
+              </a:rPr>
+              <a:t>Key Indicators of Success</a:t>
+            </a:r>
+          </a:p>
+        </p:txBody>
+      </p:sp>
+      <p:sp>
+        <p:nvSpPr>
+          <p:cNvPr id="8" name="TextBox 7">
+            <a:extLst>
+              <a:ext uri="{FF2B5EF4-FFF2-40B4-BE49-F238E27FC236}">
+                <a16:creationId xmlns:a16="http://schemas.microsoft.com/office/drawing/2014/main" id="{ED376AD0-796C-AD83-5F7D-4B8802D7ECC4}"/>
+              </a:ext>
+            </a:extLst>
+          </p:cNvPr>
+          <p:cNvSpPr txBox="1"/>
+          <p:nvPr/>
+        </p:nvSpPr>
+        <p:spPr>
+          <a:xfrm>
+            <a:off x="512597" y="1367815"/>
+            <a:ext cx="6084146" cy="4154984"/>
+          </a:xfrm>
+          <a:prstGeom prst="rect">
+            <a:avLst/>
+          </a:prstGeom>
+          <a:noFill/>
+        </p:spPr>
+        <p:txBody>
+          <a:bodyPr wrap="square" rtlCol="0">
+            <a:spAutoFit/>
+          </a:bodyPr>
+          <a:lstStyle/>
+          <a:p>
+            <a:r>
+              <a:rPr lang="en-US" sz="2400" dirty="0">
+                <a:solidFill>
+                  <a:srgbClr val="C100C2"/>
+                </a:solidFill>
+              </a:rPr>
+              <a:t>Accuracy and Precision: </a:t>
+            </a:r>
+            <a:r>
+              <a:rPr lang="en-US" sz="2400" dirty="0">
+                <a:solidFill>
+                  <a:schemeClr val="tx2"/>
+                </a:solidFill>
+              </a:rPr>
+              <a:t>Regularly measure model labelling accuracy and precision to ensure high-quality classification</a:t>
+            </a:r>
+          </a:p>
+          <a:p>
+            <a:endParaRPr lang="en-US" sz="2400" dirty="0">
+              <a:solidFill>
+                <a:schemeClr val="tx2"/>
+              </a:solidFill>
+            </a:endParaRPr>
+          </a:p>
+          <a:p>
+            <a:r>
+              <a:rPr lang="en-US" sz="2400" dirty="0">
+                <a:solidFill>
+                  <a:srgbClr val="C100C2"/>
+                </a:solidFill>
+              </a:rPr>
+              <a:t>Scalability: </a:t>
+            </a:r>
+            <a:r>
+              <a:rPr lang="en-US" sz="2400" dirty="0">
+                <a:solidFill>
+                  <a:schemeClr val="tx2"/>
+                </a:solidFill>
+              </a:rPr>
+              <a:t>Assess the model, </a:t>
+            </a:r>
+            <a:r>
+              <a:rPr lang="en-US" sz="2400" dirty="0" err="1">
+                <a:solidFill>
+                  <a:schemeClr val="tx2"/>
+                </a:solidFill>
+              </a:rPr>
+              <a:t>kafka</a:t>
+            </a:r>
+            <a:r>
+              <a:rPr lang="en-US" sz="2400" dirty="0">
+                <a:solidFill>
+                  <a:schemeClr val="tx2"/>
+                </a:solidFill>
+              </a:rPr>
+              <a:t> and database performance transaction volume grows</a:t>
+            </a:r>
+          </a:p>
+          <a:p>
+            <a:endParaRPr lang="en-US" sz="2400" dirty="0">
+              <a:solidFill>
+                <a:schemeClr val="tx2"/>
+              </a:solidFill>
+            </a:endParaRPr>
+          </a:p>
+          <a:p>
+            <a:r>
+              <a:rPr lang="en-US" sz="2400" dirty="0">
+                <a:solidFill>
+                  <a:srgbClr val="C100C2"/>
+                </a:solidFill>
+              </a:rPr>
+              <a:t>Feedback Utilization Rate: </a:t>
+            </a:r>
+            <a:r>
+              <a:rPr lang="en-US" sz="2400" dirty="0">
+                <a:solidFill>
+                  <a:schemeClr val="tx2"/>
+                </a:solidFill>
+              </a:rPr>
+              <a:t>Track the rate of feedback incorporated into retraining cycles for continuous improvement</a:t>
+            </a:r>
+          </a:p>
+        </p:txBody>
+      </p:sp>
+      <p:pic>
+        <p:nvPicPr>
+          <p:cNvPr id="5" name="Picture 4">
+            <a:extLst>
+              <a:ext uri="{FF2B5EF4-FFF2-40B4-BE49-F238E27FC236}">
+                <a16:creationId xmlns:a16="http://schemas.microsoft.com/office/drawing/2014/main" id="{675D9221-B645-EABF-B239-3E7B5E6F4DCE}"/>
+              </a:ext>
+            </a:extLst>
+          </p:cNvPr>
+          <p:cNvPicPr>
+            <a:picLocks noChangeAspect="1"/>
+          </p:cNvPicPr>
+          <p:nvPr/>
+        </p:nvPicPr>
+        <p:blipFill>
+          <a:blip r:embed="rId2">
+            <a:extLst>
+              <a:ext uri="{837473B0-CC2E-450A-ABE3-18F120FF3D39}">
+                <a1611:picAttrSrcUrl xmlns:a1611="http://schemas.microsoft.com/office/drawing/2016/11/main" r:id="rId3"/>
+              </a:ext>
+            </a:extLst>
+          </a:blip>
+          <a:stretch>
+            <a:fillRect/>
+          </a:stretch>
+        </p:blipFill>
+        <p:spPr>
+          <a:xfrm>
+            <a:off x="6754494" y="1445568"/>
+            <a:ext cx="4820618" cy="4154984"/>
+          </a:xfrm>
+          <a:prstGeom prst="rect">
+            <a:avLst/>
+          </a:prstGeom>
+        </p:spPr>
+      </p:pic>
+    </p:spTree>
+    <p:extLst>
+      <p:ext uri="{BB962C8B-B14F-4D97-AF65-F5344CB8AC3E}">
+        <p14:creationId xmlns:p14="http://schemas.microsoft.com/office/powerpoint/2010/main" val="1140865351"/>
       </p:ext>
     </p:extLst>
   </p:cSld>

</xml_diff>